<commit_message>
final PPT : QA utility , dynamic view추가
</commit_message>
<xml_diff>
--- a/doc/Docs/IoT System Final Presentation_0624.pptx
+++ b/doc/Docs/IoT System Final Presentation_0624.pptx
@@ -6470,7 +6470,7 @@
           <a:p>
             <a:r>
               <a:rPr lang="en-US" altLang="ko-KR" dirty="0" smtClean="0"/>
-              <a:t>Dynamic view  – Hyun</a:t>
+              <a:t>Time log</a:t>
             </a:r>
             <a:endParaRPr lang="ko-KR" altLang="en-US" dirty="0"/>
           </a:p>
@@ -6501,69 +6501,6 @@
               <a:t>/50</a:t>
             </a:r>
             <a:endParaRPr lang="ko-KR" altLang="en-US" dirty="0"/>
-          </a:p>
-        </p:txBody>
-      </p:sp>
-      <p:sp>
-        <p:nvSpPr>
-          <p:cNvPr id="208" name="직사각형 207"/>
-          <p:cNvSpPr/>
-          <p:nvPr/>
-        </p:nvSpPr>
-        <p:spPr>
-          <a:xfrm>
-            <a:off x="683568" y="1052736"/>
-            <a:ext cx="7704856" cy="4752528"/>
-          </a:xfrm>
-          <a:prstGeom prst="rect">
-            <a:avLst/>
-          </a:prstGeom>
-          <a:solidFill>
-            <a:sysClr val="window" lastClr="FFFFFF"/>
-          </a:solidFill>
-          <a:ln w="3175" cap="flat" cmpd="sng" algn="ctr">
-            <a:solidFill>
-              <a:sysClr val="windowText" lastClr="000000"/>
-            </a:solidFill>
-            <a:prstDash val="solid"/>
-          </a:ln>
-          <a:effectLst/>
-        </p:spPr>
-        <p:txBody>
-          <a:bodyPr rtlCol="0" anchor="ctr"/>
-          <a:lstStyle/>
-          <a:p>
-            <a:pPr marL="0" marR="0" lvl="0" indent="0" algn="ctr" defTabSz="914400" eaLnBrk="1" fontAlgn="auto" latinLnBrk="0" hangingPunct="1">
-              <a:lnSpc>
-                <a:spcPct val="100000"/>
-              </a:lnSpc>
-              <a:spcBef>
-                <a:spcPts val="0"/>
-              </a:spcBef>
-              <a:spcAft>
-                <a:spcPts val="0"/>
-              </a:spcAft>
-              <a:buClrTx/>
-              <a:buSzTx/>
-              <a:buFontTx/>
-              <a:buNone/>
-              <a:tabLst/>
-              <a:defRPr/>
-            </a:pPr>
-            <a:endParaRPr kumimoji="0" lang="ko-KR" altLang="en-US" sz="1800" b="0" i="0" u="none" strike="noStrike" kern="0" cap="none" spc="0" normalizeH="0" baseline="0" noProof="0">
-              <a:ln>
-                <a:noFill/>
-              </a:ln>
-              <a:solidFill>
-                <a:sysClr val="window" lastClr="FFFFFF"/>
-              </a:solidFill>
-              <a:effectLst/>
-              <a:uLnTx/>
-              <a:uFillTx/>
-              <a:latin typeface="맑은 고딕"/>
-              <a:ea typeface="맑은 고딕"/>
-              <a:cs typeface="+mn-cs"/>
-            </a:endParaRPr>
           </a:p>
         </p:txBody>
       </p:sp>
@@ -17955,6 +17892,69 @@
               <a:uLnTx/>
               <a:uFillTx/>
               <a:latin typeface="+mn-ea"/>
+              <a:cs typeface="+mn-cs"/>
+            </a:endParaRPr>
+          </a:p>
+        </p:txBody>
+      </p:sp>
+      <p:sp>
+        <p:nvSpPr>
+          <p:cNvPr id="410" name="직사각형 409"/>
+          <p:cNvSpPr/>
+          <p:nvPr/>
+        </p:nvSpPr>
+        <p:spPr>
+          <a:xfrm>
+            <a:off x="835968" y="1205136"/>
+            <a:ext cx="7704856" cy="4752528"/>
+          </a:xfrm>
+          <a:prstGeom prst="rect">
+            <a:avLst/>
+          </a:prstGeom>
+          <a:solidFill>
+            <a:sysClr val="window" lastClr="FFFFFF"/>
+          </a:solidFill>
+          <a:ln w="3175" cap="flat" cmpd="sng" algn="ctr">
+            <a:solidFill>
+              <a:sysClr val="windowText" lastClr="000000"/>
+            </a:solidFill>
+            <a:prstDash val="solid"/>
+          </a:ln>
+          <a:effectLst/>
+        </p:spPr>
+        <p:txBody>
+          <a:bodyPr rtlCol="0" anchor="ctr"/>
+          <a:lstStyle/>
+          <a:p>
+            <a:pPr marL="0" marR="0" lvl="0" indent="0" algn="ctr" defTabSz="914400" eaLnBrk="1" fontAlgn="auto" latinLnBrk="0" hangingPunct="1">
+              <a:lnSpc>
+                <a:spcPct val="100000"/>
+              </a:lnSpc>
+              <a:spcBef>
+                <a:spcPts val="0"/>
+              </a:spcBef>
+              <a:spcAft>
+                <a:spcPts val="0"/>
+              </a:spcAft>
+              <a:buClrTx/>
+              <a:buSzTx/>
+              <a:buFontTx/>
+              <a:buNone/>
+              <a:tabLst/>
+              <a:defRPr/>
+            </a:pPr>
+            <a:endParaRPr kumimoji="0" lang="ko-KR" altLang="en-US" sz="1800" b="0" i="0" u="none" strike="noStrike" kern="0" cap="none" spc="0" normalizeH="0" baseline="0" noProof="0">
+              <a:ln>
+                <a:noFill/>
+              </a:ln>
+              <a:solidFill>
+                <a:sysClr val="window" lastClr="FFFFFF"/>
+              </a:solidFill>
+              <a:effectLst/>
+              <a:uLnTx/>
+              <a:uFillTx/>
+              <a:latin typeface="맑은 고딕"/>
+              <a:ea typeface="맑은 고딕"/>
               <a:cs typeface="+mn-cs"/>
             </a:endParaRPr>
           </a:p>
@@ -26093,16 +26093,6 @@
                         </a:rPr>
                         <a:t>Availability</a:t>
                       </a:r>
-                      <a:endParaRPr lang="ko-KR" altLang="en-US" sz="1400" dirty="0">
-                        <a:solidFill>
-                          <a:schemeClr val="bg1"/>
-                        </a:solidFill>
-                        <a:latin typeface="Tahoma" panose="020B0604030504040204" pitchFamily="34" charset="0"/>
-                        <a:cs typeface="Tahoma" panose="020B0604030504040204" pitchFamily="34" charset="0"/>
-                      </a:endParaRPr>
-                    </a:p>
-                    <a:p>
-                      <a:pPr algn="l" rtl="0" fontAlgn="ctr"/>
                       <a:r>
                         <a:rPr lang="en-US" sz="1400" b="0" i="0" u="none" strike="noStrike" dirty="0" smtClean="0">
                           <a:solidFill>

</xml_diff>

<commit_message>
add add/remove node to final presentation
add add/remove node to final presentation
</commit_message>
<xml_diff>
--- a/doc/Docs/IoT System Final Presentation_0624.pptx
+++ b/doc/Docs/IoT System Final Presentation_0624.pptx
@@ -5,7 +5,7 @@
     <p:sldMasterId id="2147483693" r:id="rId1"/>
   </p:sldMasterIdLst>
   <p:notesMasterIdLst>
-    <p:notesMasterId r:id="rId16"/>
+    <p:notesMasterId r:id="rId18"/>
   </p:notesMasterIdLst>
   <p:sldIdLst>
     <p:sldId id="256" r:id="rId2"/>
@@ -21,7 +21,9 @@
     <p:sldId id="319" r:id="rId12"/>
     <p:sldId id="320" r:id="rId13"/>
     <p:sldId id="321" r:id="rId14"/>
-    <p:sldId id="322" r:id="rId15"/>
+    <p:sldId id="323" r:id="rId15"/>
+    <p:sldId id="324" r:id="rId16"/>
+    <p:sldId id="322" r:id="rId17"/>
   </p:sldIdLst>
   <p:sldSz cx="9144000" cy="6858000" type="screen4x3"/>
   <p:notesSz cx="6858000" cy="9144000"/>
@@ -138,13 +140,15 @@
             <p14:sldId id="319"/>
             <p14:sldId id="320"/>
             <p14:sldId id="321"/>
+            <p14:sldId id="323"/>
+            <p14:sldId id="324"/>
             <p14:sldId id="322"/>
           </p14:sldIdLst>
         </p14:section>
       </p14:sectionLst>
     </p:ext>
     <p:ext uri="{EFAFB233-063F-42B5-8137-9DF3F51BA10A}">
-      <p15:sldGuideLst xmlns:p15="http://schemas.microsoft.com/office/powerpoint/2012/main" xmlns="">
+      <p15:sldGuideLst xmlns:p15="http://schemas.microsoft.com/office/powerpoint/2012/main">
         <p15:guide id="1" orient="horz" pos="527">
           <p15:clr>
             <a:srgbClr val="A4A3A4"/>
@@ -168,7 +172,7 @@
       </p15:sldGuideLst>
     </p:ext>
     <p:ext uri="{2D200454-40CA-4A62-9FC3-DE9A4176ACB9}">
-      <p15:notesGuideLst xmlns:p15="http://schemas.microsoft.com/office/powerpoint/2012/main" xmlns="">
+      <p15:notesGuideLst xmlns:p15="http://schemas.microsoft.com/office/powerpoint/2012/main">
         <p15:guide id="1" orient="horz" pos="2879">
           <p15:clr>
             <a:srgbClr val="A4A3A4"/>
@@ -18288,6 +18292,13 @@
   <p:clrMapOvr>
     <a:masterClrMapping/>
   </p:clrMapOvr>
+  <p:timing>
+    <p:tnLst>
+      <p:par>
+        <p:cTn id="1" dur="indefinite" restart="never" nodeType="tmRoot"/>
+      </p:par>
+    </p:tnLst>
+  </p:timing>
 </p:sld>
 </file>
 
@@ -18326,20 +18337,12 @@
           <a:lstStyle/>
           <a:p>
             <a:r>
+              <a:rPr lang="en-US" altLang="ko-KR" dirty="0" smtClean="0"/>
+              <a:t>Scalability – </a:t>
+            </a:r>
+            <a:r>
               <a:rPr lang="en-US" altLang="ko-KR" dirty="0" err="1" smtClean="0"/>
-              <a:t>Func</a:t>
-            </a:r>
-            <a:r>
-              <a:rPr lang="en-US" altLang="ko-KR" dirty="0" smtClean="0"/>
-              <a:t> </a:t>
-            </a:r>
-            <a:r>
-              <a:rPr lang="en-US" altLang="ko-KR" dirty="0" err="1" smtClean="0"/>
-              <a:t>Req</a:t>
-            </a:r>
-            <a:r>
-              <a:rPr lang="en-US" altLang="ko-KR" dirty="0" smtClean="0"/>
-              <a:t> - User defined rule</a:t>
+              <a:t>AddNode</a:t>
             </a:r>
             <a:endParaRPr lang="ko-KR" altLang="en-US" dirty="0"/>
           </a:p>
@@ -18366,26 +18369,8 @@
             </a:pPr>
             <a:r>
               <a:rPr lang="en-US" altLang="ko-KR" dirty="0" smtClean="0"/>
-              <a:t>Rule checking algorithm to add rules by user.</a:t>
-            </a:r>
-          </a:p>
-          <a:p>
-            <a:pPr marL="285750" indent="-285750">
-              <a:buFontTx/>
-              <a:buChar char="-"/>
-            </a:pPr>
-            <a:r>
-              <a:rPr lang="en-US" altLang="ko-KR" sz="1200" dirty="0" smtClean="0"/>
-              <a:t>Rule            := if {conditions} then {actions</a:t>
-            </a:r>
-            <a:r>
-              <a:rPr lang="en-US" altLang="ko-KR" dirty="0" smtClean="0"/>
-              <a:t>}</a:t>
-            </a:r>
-          </a:p>
-          <a:p>
-            <a:pPr marL="0" indent="0"/>
-            <a:endParaRPr lang="ko-KR" altLang="en-US" sz="1200" dirty="0"/>
+              <a:t>Add new node by User</a:t>
+            </a:r>
           </a:p>
         </p:txBody>
       </p:sp>
@@ -18408,6 +18393,337 @@
               <a:rPr lang="ko-KR" altLang="en-US" smtClean="0"/>
               <a:pPr/>
               <a:t>14</a:t>
+            </a:fld>
+            <a:r>
+              <a:rPr lang="en-US" altLang="ko-KR" smtClean="0"/>
+              <a:t>/50</a:t>
+            </a:r>
+            <a:endParaRPr lang="ko-KR" altLang="en-US" dirty="0"/>
+          </a:p>
+        </p:txBody>
+      </p:sp>
+      <p:pic>
+        <p:nvPicPr>
+          <p:cNvPr id="1026" name="Picture 2"/>
+          <p:cNvPicPr>
+            <a:picLocks noChangeAspect="1" noChangeArrowheads="1"/>
+          </p:cNvPicPr>
+          <p:nvPr/>
+        </p:nvPicPr>
+        <p:blipFill>
+          <a:blip r:embed="rId2">
+            <a:extLst>
+              <a:ext uri="{28A0092B-C50C-407E-A947-70E740481C1C}">
+                <a14:useLocalDpi xmlns:a14="http://schemas.microsoft.com/office/drawing/2010/main" val="0"/>
+              </a:ext>
+            </a:extLst>
+          </a:blip>
+          <a:srcRect/>
+          <a:stretch>
+            <a:fillRect/>
+          </a:stretch>
+        </p:blipFill>
+        <p:spPr bwMode="auto">
+          <a:xfrm>
+            <a:off x="475786" y="1268760"/>
+            <a:ext cx="8199902" cy="4829954"/>
+          </a:xfrm>
+          <a:prstGeom prst="rect">
+            <a:avLst/>
+          </a:prstGeom>
+          <a:noFill/>
+          <a:extLst>
+            <a:ext uri="{909E8E84-426E-40DD-AFC4-6F175D3DCCD1}">
+              <a14:hiddenFill xmlns:a14="http://schemas.microsoft.com/office/drawing/2010/main">
+                <a:solidFill>
+                  <a:srgbClr val="FFFFFF"/>
+                </a:solidFill>
+              </a14:hiddenFill>
+            </a:ext>
+          </a:extLst>
+        </p:spPr>
+      </p:pic>
+    </p:spTree>
+    <p:extLst>
+      <p:ext uri="{BB962C8B-B14F-4D97-AF65-F5344CB8AC3E}">
+        <p14:creationId xmlns:p14="http://schemas.microsoft.com/office/powerpoint/2010/main" val="1335988186"/>
+      </p:ext>
+    </p:extLst>
+  </p:cSld>
+  <p:clrMapOvr>
+    <a:masterClrMapping/>
+  </p:clrMapOvr>
+  <p:timing>
+    <p:tnLst>
+      <p:par>
+        <p:cTn id="1" dur="indefinite" restart="never" nodeType="tmRoot"/>
+      </p:par>
+    </p:tnLst>
+  </p:timing>
+</p:sld>
+</file>
+
+<file path=ppt/slides/slide15.xml><?xml version="1.0" encoding="utf-8"?>
+<p:sld xmlns:a="http://schemas.openxmlformats.org/drawingml/2006/main" xmlns:r="http://schemas.openxmlformats.org/officeDocument/2006/relationships" xmlns:p="http://schemas.openxmlformats.org/presentationml/2006/main">
+  <p:cSld>
+    <p:spTree>
+      <p:nvGrpSpPr>
+        <p:cNvPr id="1" name=""/>
+        <p:cNvGrpSpPr/>
+        <p:nvPr/>
+      </p:nvGrpSpPr>
+      <p:grpSpPr>
+        <a:xfrm>
+          <a:off x="0" y="0"/>
+          <a:ext cx="0" cy="0"/>
+          <a:chOff x="0" y="0"/>
+          <a:chExt cx="0" cy="0"/>
+        </a:xfrm>
+      </p:grpSpPr>
+      <p:sp>
+        <p:nvSpPr>
+          <p:cNvPr id="2" name="제목 1"/>
+          <p:cNvSpPr>
+            <a:spLocks noGrp="1"/>
+          </p:cNvSpPr>
+          <p:nvPr>
+            <p:ph type="title"/>
+          </p:nvPr>
+        </p:nvSpPr>
+        <p:spPr/>
+        <p:txBody>
+          <a:bodyPr>
+            <a:normAutofit fontScale="90000"/>
+          </a:bodyPr>
+          <a:lstStyle/>
+          <a:p>
+            <a:r>
+              <a:rPr lang="en-US" altLang="ko-KR" dirty="0" smtClean="0"/>
+              <a:t>Scalability – </a:t>
+            </a:r>
+            <a:r>
+              <a:rPr lang="en-US" altLang="ko-KR" dirty="0" err="1" smtClean="0"/>
+              <a:t>RemoveNode</a:t>
+            </a:r>
+            <a:endParaRPr lang="ko-KR" altLang="en-US" dirty="0"/>
+          </a:p>
+        </p:txBody>
+      </p:sp>
+      <p:sp>
+        <p:nvSpPr>
+          <p:cNvPr id="3" name="텍스트 개체 틀 2"/>
+          <p:cNvSpPr>
+            <a:spLocks noGrp="1"/>
+          </p:cNvSpPr>
+          <p:nvPr>
+            <p:ph type="body" sz="quarter" idx="10"/>
+          </p:nvPr>
+        </p:nvSpPr>
+        <p:spPr/>
+        <p:txBody>
+          <a:bodyPr/>
+          <a:lstStyle/>
+          <a:p>
+            <a:pPr marL="285750" indent="-285750">
+              <a:buFontTx/>
+              <a:buChar char="-"/>
+            </a:pPr>
+            <a:r>
+              <a:rPr lang="en-US" altLang="ko-KR" dirty="0" smtClean="0"/>
+              <a:t>Remove node by User</a:t>
+            </a:r>
+          </a:p>
+        </p:txBody>
+      </p:sp>
+      <p:sp>
+        <p:nvSpPr>
+          <p:cNvPr id="4" name="슬라이드 번호 개체 틀 3"/>
+          <p:cNvSpPr>
+            <a:spLocks noGrp="1"/>
+          </p:cNvSpPr>
+          <p:nvPr>
+            <p:ph type="sldNum" sz="quarter" idx="11"/>
+          </p:nvPr>
+        </p:nvSpPr>
+        <p:spPr/>
+        <p:txBody>
+          <a:bodyPr/>
+          <a:lstStyle/>
+          <a:p>
+            <a:fld id="{887F5A62-5D57-4BBA-9485-2C5A6728F77D}" type="slidenum">
+              <a:rPr lang="ko-KR" altLang="en-US" smtClean="0"/>
+              <a:pPr/>
+              <a:t>15</a:t>
+            </a:fld>
+            <a:r>
+              <a:rPr lang="en-US" altLang="ko-KR" smtClean="0"/>
+              <a:t>/50</a:t>
+            </a:r>
+            <a:endParaRPr lang="ko-KR" altLang="en-US" dirty="0"/>
+          </a:p>
+        </p:txBody>
+      </p:sp>
+      <p:pic>
+        <p:nvPicPr>
+          <p:cNvPr id="5" name="그림 4"/>
+          <p:cNvPicPr>
+            <a:picLocks noChangeAspect="1"/>
+          </p:cNvPicPr>
+          <p:nvPr/>
+        </p:nvPicPr>
+        <p:blipFill>
+          <a:blip r:embed="rId2"/>
+          <a:stretch>
+            <a:fillRect/>
+          </a:stretch>
+        </p:blipFill>
+        <p:spPr>
+          <a:xfrm>
+            <a:off x="456843" y="1340768"/>
+            <a:ext cx="8230313" cy="4846740"/>
+          </a:xfrm>
+          <a:prstGeom prst="rect">
+            <a:avLst/>
+          </a:prstGeom>
+        </p:spPr>
+      </p:pic>
+    </p:spTree>
+    <p:extLst>
+      <p:ext uri="{BB962C8B-B14F-4D97-AF65-F5344CB8AC3E}">
+        <p14:creationId xmlns:p14="http://schemas.microsoft.com/office/powerpoint/2010/main" val="1861498841"/>
+      </p:ext>
+    </p:extLst>
+  </p:cSld>
+  <p:clrMapOvr>
+    <a:masterClrMapping/>
+  </p:clrMapOvr>
+  <p:timing>
+    <p:tnLst>
+      <p:par>
+        <p:cTn id="1" dur="indefinite" restart="never" nodeType="tmRoot"/>
+      </p:par>
+    </p:tnLst>
+  </p:timing>
+</p:sld>
+</file>
+
+<file path=ppt/slides/slide16.xml><?xml version="1.0" encoding="utf-8"?>
+<p:sld xmlns:a="http://schemas.openxmlformats.org/drawingml/2006/main" xmlns:r="http://schemas.openxmlformats.org/officeDocument/2006/relationships" xmlns:p="http://schemas.openxmlformats.org/presentationml/2006/main">
+  <p:cSld>
+    <p:spTree>
+      <p:nvGrpSpPr>
+        <p:cNvPr id="1" name=""/>
+        <p:cNvGrpSpPr/>
+        <p:nvPr/>
+      </p:nvGrpSpPr>
+      <p:grpSpPr>
+        <a:xfrm>
+          <a:off x="0" y="0"/>
+          <a:ext cx="0" cy="0"/>
+          <a:chOff x="0" y="0"/>
+          <a:chExt cx="0" cy="0"/>
+        </a:xfrm>
+      </p:grpSpPr>
+      <p:sp>
+        <p:nvSpPr>
+          <p:cNvPr id="2" name="제목 1"/>
+          <p:cNvSpPr>
+            <a:spLocks noGrp="1"/>
+          </p:cNvSpPr>
+          <p:nvPr>
+            <p:ph type="title"/>
+          </p:nvPr>
+        </p:nvSpPr>
+        <p:spPr/>
+        <p:txBody>
+          <a:bodyPr>
+            <a:normAutofit fontScale="90000"/>
+          </a:bodyPr>
+          <a:lstStyle/>
+          <a:p>
+            <a:r>
+              <a:rPr lang="en-US" altLang="ko-KR" dirty="0" err="1" smtClean="0"/>
+              <a:t>Func</a:t>
+            </a:r>
+            <a:r>
+              <a:rPr lang="en-US" altLang="ko-KR" dirty="0" smtClean="0"/>
+              <a:t> </a:t>
+            </a:r>
+            <a:r>
+              <a:rPr lang="en-US" altLang="ko-KR" dirty="0" err="1" smtClean="0"/>
+              <a:t>Req</a:t>
+            </a:r>
+            <a:r>
+              <a:rPr lang="en-US" altLang="ko-KR" dirty="0" smtClean="0"/>
+              <a:t> - User defined rule</a:t>
+            </a:r>
+            <a:endParaRPr lang="ko-KR" altLang="en-US" dirty="0"/>
+          </a:p>
+        </p:txBody>
+      </p:sp>
+      <p:sp>
+        <p:nvSpPr>
+          <p:cNvPr id="3" name="텍스트 개체 틀 2"/>
+          <p:cNvSpPr>
+            <a:spLocks noGrp="1"/>
+          </p:cNvSpPr>
+          <p:nvPr>
+            <p:ph type="body" sz="quarter" idx="10"/>
+          </p:nvPr>
+        </p:nvSpPr>
+        <p:spPr/>
+        <p:txBody>
+          <a:bodyPr/>
+          <a:lstStyle/>
+          <a:p>
+            <a:pPr marL="285750" indent="-285750">
+              <a:buFontTx/>
+              <a:buChar char="-"/>
+            </a:pPr>
+            <a:r>
+              <a:rPr lang="en-US" altLang="ko-KR" dirty="0" smtClean="0"/>
+              <a:t>Rule checking algorithm to add rules by user.</a:t>
+            </a:r>
+          </a:p>
+          <a:p>
+            <a:pPr marL="285750" indent="-285750">
+              <a:buFontTx/>
+              <a:buChar char="-"/>
+            </a:pPr>
+            <a:r>
+              <a:rPr lang="en-US" altLang="ko-KR" sz="1200" dirty="0" smtClean="0"/>
+              <a:t>Rule            := if {conditions} then {actions</a:t>
+            </a:r>
+            <a:r>
+              <a:rPr lang="en-US" altLang="ko-KR" dirty="0" smtClean="0"/>
+              <a:t>}</a:t>
+            </a:r>
+          </a:p>
+          <a:p>
+            <a:pPr marL="0" indent="0"/>
+            <a:endParaRPr lang="ko-KR" altLang="en-US" sz="1200" dirty="0"/>
+          </a:p>
+        </p:txBody>
+      </p:sp>
+      <p:sp>
+        <p:nvSpPr>
+          <p:cNvPr id="4" name="슬라이드 번호 개체 틀 3"/>
+          <p:cNvSpPr>
+            <a:spLocks noGrp="1"/>
+          </p:cNvSpPr>
+          <p:nvPr>
+            <p:ph type="sldNum" sz="quarter" idx="11"/>
+          </p:nvPr>
+        </p:nvSpPr>
+        <p:spPr/>
+        <p:txBody>
+          <a:bodyPr/>
+          <a:lstStyle/>
+          <a:p>
+            <a:fld id="{887F5A62-5D57-4BBA-9485-2C5A6728F77D}" type="slidenum">
+              <a:rPr lang="ko-KR" altLang="en-US" smtClean="0"/>
+              <a:pPr/>
+              <a:t>16</a:t>
             </a:fld>
             <a:r>
               <a:rPr lang="en-US" altLang="ko-KR" smtClean="0"/>
@@ -18468,6 +18784,13 @@
   <p:clrMapOvr>
     <a:masterClrMapping/>
   </p:clrMapOvr>
+  <p:timing>
+    <p:tnLst>
+      <p:par>
+        <p:cTn id="1" dur="indefinite" restart="never" nodeType="tmRoot"/>
+      </p:par>
+    </p:tnLst>
+  </p:timing>
 </p:sld>
 </file>
 

</xml_diff>